<commit_message>
adding wait operations in pptx
</commit_message>
<xml_diff>
--- a/docs/resources/presentations/Selenium Essentials.pptx
+++ b/docs/resources/presentations/Selenium Essentials.pptx
@@ -9,6 +9,7 @@
     <p:sldId id="257" r:id="rId3"/>
     <p:sldId id="258" r:id="rId4"/>
     <p:sldId id="259" r:id="rId5"/>
+    <p:sldId id="260" r:id="rId6"/>
   </p:sldIdLst>
   <p:sldSz cx="12192000" cy="6858000"/>
   <p:notesSz cx="6858000" cy="9144000"/>
@@ -6493,7 +6494,7 @@
           <a:p>
             <a:fld id="{4AAD347D-5ACD-4C99-B74B-A9C85AD731AF}" type="datetimeFigureOut">
               <a:rPr lang="en-US" smtClean="0"/>
-              <a:t>9/1/2019</a:t>
+              <a:t>9/8/2019</a:t>
             </a:fld>
             <a:endParaRPr lang="en-US" dirty="0"/>
           </a:p>
@@ -6683,7 +6684,7 @@
           <a:p>
             <a:fld id="{4AAD347D-5ACD-4C99-B74B-A9C85AD731AF}" type="datetimeFigureOut">
               <a:rPr lang="en-US" smtClean="0"/>
-              <a:t>9/1/2019</a:t>
+              <a:t>9/8/2019</a:t>
             </a:fld>
             <a:endParaRPr lang="en-US" dirty="0"/>
           </a:p>
@@ -6864,7 +6865,7 @@
           <a:p>
             <a:fld id="{4AAD347D-5ACD-4C99-B74B-A9C85AD731AF}" type="datetimeFigureOut">
               <a:rPr lang="en-US" smtClean="0"/>
-              <a:t>9/1/2019</a:t>
+              <a:t>9/8/2019</a:t>
             </a:fld>
             <a:endParaRPr lang="en-US" dirty="0"/>
           </a:p>
@@ -7035,7 +7036,7 @@
           <a:p>
             <a:fld id="{4AAD347D-5ACD-4C99-B74B-A9C85AD731AF}" type="datetimeFigureOut">
               <a:rPr lang="en-US" smtClean="0"/>
-              <a:t>9/1/2019</a:t>
+              <a:t>9/8/2019</a:t>
             </a:fld>
             <a:endParaRPr lang="en-US" dirty="0"/>
           </a:p>
@@ -7292,7 +7293,7 @@
           <a:p>
             <a:fld id="{9796027F-7875-4030-9381-8BD8C4F21935}" type="datetimeFigureOut">
               <a:rPr lang="en-US" smtClean="0"/>
-              <a:t>9/1/2019</a:t>
+              <a:t>9/8/2019</a:t>
             </a:fld>
             <a:endParaRPr lang="en-US" dirty="0"/>
           </a:p>
@@ -7580,7 +7581,7 @@
           <a:p>
             <a:fld id="{4AAD347D-5ACD-4C99-B74B-A9C85AD731AF}" type="datetimeFigureOut">
               <a:rPr lang="en-US" smtClean="0"/>
-              <a:t>9/1/2019</a:t>
+              <a:t>9/8/2019</a:t>
             </a:fld>
             <a:endParaRPr lang="en-US" dirty="0"/>
           </a:p>
@@ -8019,7 +8020,7 @@
           <a:p>
             <a:fld id="{4AAD347D-5ACD-4C99-B74B-A9C85AD731AF}" type="datetimeFigureOut">
               <a:rPr lang="en-US" smtClean="0"/>
-              <a:t>9/1/2019</a:t>
+              <a:t>9/8/2019</a:t>
             </a:fld>
             <a:endParaRPr lang="en-US" dirty="0"/>
           </a:p>
@@ -8138,7 +8139,7 @@
           <a:p>
             <a:fld id="{4509A250-FF31-4206-8172-F9D3106AACB1}" type="datetimeFigureOut">
               <a:rPr lang="en-US" smtClean="0"/>
-              <a:t>9/1/2019</a:t>
+              <a:t>9/8/2019</a:t>
             </a:fld>
             <a:endParaRPr lang="en-US" dirty="0"/>
           </a:p>
@@ -8233,7 +8234,7 @@
           <a:p>
             <a:fld id="{4509A250-FF31-4206-8172-F9D3106AACB1}" type="datetimeFigureOut">
               <a:rPr lang="en-US" smtClean="0"/>
-              <a:t>9/1/2019</a:t>
+              <a:t>9/8/2019</a:t>
             </a:fld>
             <a:endParaRPr lang="en-US" dirty="0"/>
           </a:p>
@@ -8589,7 +8590,7 @@
           <a:p>
             <a:fld id="{4AAD347D-5ACD-4C99-B74B-A9C85AD731AF}" type="datetimeFigureOut">
               <a:rPr lang="en-US" smtClean="0"/>
-              <a:t>9/1/2019</a:t>
+              <a:t>9/8/2019</a:t>
             </a:fld>
             <a:endParaRPr lang="en-US" dirty="0"/>
           </a:p>
@@ -8906,7 +8907,7 @@
           <a:p>
             <a:fld id="{4509A250-FF31-4206-8172-F9D3106AACB1}" type="datetimeFigureOut">
               <a:rPr lang="en-US" smtClean="0"/>
-              <a:t>9/1/2019</a:t>
+              <a:t>9/8/2019</a:t>
             </a:fld>
             <a:endParaRPr lang="en-US" dirty="0"/>
           </a:p>
@@ -9139,7 +9140,7 @@
           <a:p>
             <a:fld id="{4AAD347D-5ACD-4C99-B74B-A9C85AD731AF}" type="datetimeFigureOut">
               <a:rPr lang="en-US" smtClean="0"/>
-              <a:t>9/1/2019</a:t>
+              <a:t>9/8/2019</a:t>
             </a:fld>
             <a:endParaRPr lang="en-US" dirty="0"/>
           </a:p>
@@ -13421,6 +13422,583 @@
 </p:sld>
 </file>
 
+<file path=ppt/slides/slide5.xml><?xml version="1.0" encoding="utf-8"?>
+<p:sld xmlns:a="http://schemas.openxmlformats.org/drawingml/2006/main" xmlns:r="http://schemas.openxmlformats.org/officeDocument/2006/relationships" xmlns:p="http://schemas.openxmlformats.org/presentationml/2006/main">
+  <p:cSld>
+    <p:spTree>
+      <p:nvGrpSpPr>
+        <p:cNvPr id="1" name=""/>
+        <p:cNvGrpSpPr/>
+        <p:nvPr/>
+      </p:nvGrpSpPr>
+      <p:grpSpPr>
+        <a:xfrm>
+          <a:off x="0" y="0"/>
+          <a:ext cx="0" cy="0"/>
+          <a:chOff x="0" y="0"/>
+          <a:chExt cx="0" cy="0"/>
+        </a:xfrm>
+      </p:grpSpPr>
+      <p:graphicFrame>
+        <p:nvGraphicFramePr>
+          <p:cNvPr id="4" name="Table 4">
+            <a:extLst>
+              <a:ext uri="{FF2B5EF4-FFF2-40B4-BE49-F238E27FC236}">
+                <a16:creationId xmlns:a16="http://schemas.microsoft.com/office/drawing/2014/main" id="{74DB245F-8A67-4C19-AE14-B222653D6F88}"/>
+              </a:ext>
+            </a:extLst>
+          </p:cNvPr>
+          <p:cNvGraphicFramePr>
+            <a:graphicFrameLocks noGrp="1"/>
+          </p:cNvGraphicFramePr>
+          <p:nvPr>
+            <p:extLst>
+              <p:ext uri="{D42A27DB-BD31-4B8C-83A1-F6EECF244321}">
+                <p14:modId xmlns:p14="http://schemas.microsoft.com/office/powerpoint/2010/main" val="892003522"/>
+              </p:ext>
+            </p:extLst>
+          </p:nvPr>
+        </p:nvGraphicFramePr>
+        <p:xfrm>
+          <a:off x="163891" y="166384"/>
+          <a:ext cx="11869892" cy="6104934"/>
+        </p:xfrm>
+        <a:graphic>
+          <a:graphicData uri="http://schemas.openxmlformats.org/drawingml/2006/table">
+            <a:tbl>
+              <a:tblPr firstRow="1" bandRow="1">
+                <a:tableStyleId>{5C22544A-7EE6-4342-B048-85BDC9FD1C3A}</a:tableStyleId>
+              </a:tblPr>
+              <a:tblGrid>
+                <a:gridCol w="4219645">
+                  <a:extLst>
+                    <a:ext uri="{9D8B030D-6E8A-4147-A177-3AD203B41FA5}">
+                      <a16:colId xmlns:a16="http://schemas.microsoft.com/office/drawing/2014/main" val="2722989189"/>
+                    </a:ext>
+                  </a:extLst>
+                </a:gridCol>
+                <a:gridCol w="7650247">
+                  <a:extLst>
+                    <a:ext uri="{9D8B030D-6E8A-4147-A177-3AD203B41FA5}">
+                      <a16:colId xmlns:a16="http://schemas.microsoft.com/office/drawing/2014/main" val="1463560156"/>
+                    </a:ext>
+                  </a:extLst>
+                </a:gridCol>
+              </a:tblGrid>
+              <a:tr h="536086">
+                <a:tc>
+                  <a:txBody>
+                    <a:bodyPr/>
+                    <a:lstStyle/>
+                    <a:p>
+                      <a:r>
+                        <a:rPr lang="en-US" sz="2400" dirty="0"/>
+                        <a:t>Wait Methods</a:t>
+                      </a:r>
+                    </a:p>
+                  </a:txBody>
+                  <a:tcPr anchor="ctr"/>
+                </a:tc>
+                <a:tc>
+                  <a:txBody>
+                    <a:bodyPr/>
+                    <a:lstStyle/>
+                    <a:p>
+                      <a:r>
+                        <a:rPr lang="en-US" sz="2400" dirty="0"/>
+                        <a:t>Description</a:t>
+                      </a:r>
+                    </a:p>
+                  </a:txBody>
+                  <a:tcPr anchor="ctr"/>
+                </a:tc>
+                <a:extLst>
+                  <a:ext uri="{0D108BD9-81ED-4DB2-BD59-A6C34878D82A}">
+                    <a16:rowId xmlns:a16="http://schemas.microsoft.com/office/drawing/2014/main" val="2543134648"/>
+                  </a:ext>
+                </a:extLst>
+              </a:tr>
+              <a:tr h="536086">
+                <a:tc>
+                  <a:txBody>
+                    <a:bodyPr/>
+                    <a:lstStyle/>
+                    <a:p>
+                      <a:r>
+                        <a:rPr lang="en-US" sz="2400" dirty="0" err="1"/>
+                        <a:t>WaitUntilElementVisible</a:t>
+                      </a:r>
+                      <a:endParaRPr lang="en-US" sz="2400" dirty="0"/>
+                    </a:p>
+                  </a:txBody>
+                  <a:tcPr anchor="ctr"/>
+                </a:tc>
+                <a:tc>
+                  <a:txBody>
+                    <a:bodyPr/>
+                    <a:lstStyle/>
+                    <a:p>
+                      <a:r>
+                        <a:rPr lang="en-AU" sz="1800" kern="1200" dirty="0">
+                          <a:solidFill>
+                            <a:schemeClr val="dk1"/>
+                          </a:solidFill>
+                          <a:latin typeface="+mn-lt"/>
+                          <a:ea typeface="+mn-ea"/>
+                          <a:cs typeface="+mn-cs"/>
+                        </a:rPr>
+                        <a:t>Wait until the element is visible</a:t>
+                      </a:r>
+                      <a:endParaRPr lang="en-US" sz="2400" dirty="0"/>
+                    </a:p>
+                  </a:txBody>
+                  <a:tcPr anchor="ctr"/>
+                </a:tc>
+                <a:extLst>
+                  <a:ext uri="{0D108BD9-81ED-4DB2-BD59-A6C34878D82A}">
+                    <a16:rowId xmlns:a16="http://schemas.microsoft.com/office/drawing/2014/main" val="1771650175"/>
+                  </a:ext>
+                </a:extLst>
+              </a:tr>
+              <a:tr h="536086">
+                <a:tc>
+                  <a:txBody>
+                    <a:bodyPr/>
+                    <a:lstStyle/>
+                    <a:p>
+                      <a:r>
+                        <a:rPr lang="en-US" sz="2400" dirty="0" err="1"/>
+                        <a:t>WaitUntilElementInvisible</a:t>
+                      </a:r>
+                      <a:endParaRPr lang="en-US" sz="2400" dirty="0"/>
+                    </a:p>
+                  </a:txBody>
+                  <a:tcPr anchor="ctr"/>
+                </a:tc>
+                <a:tc>
+                  <a:txBody>
+                    <a:bodyPr/>
+                    <a:lstStyle/>
+                    <a:p>
+                      <a:r>
+                        <a:rPr lang="en-AU" sz="1800" kern="1200" dirty="0">
+                          <a:solidFill>
+                            <a:schemeClr val="dk1"/>
+                          </a:solidFill>
+                          <a:latin typeface="+mn-lt"/>
+                          <a:ea typeface="+mn-ea"/>
+                          <a:cs typeface="+mn-cs"/>
+                        </a:rPr>
+                        <a:t>Wait until the element goes invisible </a:t>
+                      </a:r>
+                      <a:endParaRPr lang="en-US" sz="2400" dirty="0"/>
+                    </a:p>
+                  </a:txBody>
+                  <a:tcPr anchor="ctr"/>
+                </a:tc>
+                <a:extLst>
+                  <a:ext uri="{0D108BD9-81ED-4DB2-BD59-A6C34878D82A}">
+                    <a16:rowId xmlns:a16="http://schemas.microsoft.com/office/drawing/2014/main" val="2179964973"/>
+                  </a:ext>
+                </a:extLst>
+              </a:tr>
+              <a:tr h="536086">
+                <a:tc>
+                  <a:txBody>
+                    <a:bodyPr/>
+                    <a:lstStyle/>
+                    <a:p>
+                      <a:r>
+                        <a:rPr lang="en-US" sz="2400" dirty="0" err="1"/>
+                        <a:t>WaitUntilElementEnabled</a:t>
+                      </a:r>
+                      <a:endParaRPr lang="en-US" sz="2400" dirty="0"/>
+                    </a:p>
+                  </a:txBody>
+                  <a:tcPr anchor="ctr"/>
+                </a:tc>
+                <a:tc>
+                  <a:txBody>
+                    <a:bodyPr/>
+                    <a:lstStyle/>
+                    <a:p>
+                      <a:r>
+                        <a:rPr lang="en-AU" sz="1800" kern="1200" dirty="0">
+                          <a:solidFill>
+                            <a:schemeClr val="dk1"/>
+                          </a:solidFill>
+                          <a:latin typeface="+mn-lt"/>
+                          <a:ea typeface="+mn-ea"/>
+                          <a:cs typeface="+mn-cs"/>
+                        </a:rPr>
+                        <a:t>Wait until the element is enabled</a:t>
+                      </a:r>
+                      <a:endParaRPr lang="en-US" sz="2400" dirty="0"/>
+                    </a:p>
+                  </a:txBody>
+                  <a:tcPr anchor="ctr"/>
+                </a:tc>
+                <a:extLst>
+                  <a:ext uri="{0D108BD9-81ED-4DB2-BD59-A6C34878D82A}">
+                    <a16:rowId xmlns:a16="http://schemas.microsoft.com/office/drawing/2014/main" val="4287723469"/>
+                  </a:ext>
+                </a:extLst>
+              </a:tr>
+              <a:tr h="536086">
+                <a:tc>
+                  <a:txBody>
+                    <a:bodyPr/>
+                    <a:lstStyle/>
+                    <a:p>
+                      <a:r>
+                        <a:rPr lang="en-US" sz="2400" dirty="0" err="1"/>
+                        <a:t>WaitUntilElementExists</a:t>
+                      </a:r>
+                      <a:endParaRPr lang="en-US" sz="2400" dirty="0"/>
+                    </a:p>
+                  </a:txBody>
+                  <a:tcPr anchor="ctr"/>
+                </a:tc>
+                <a:tc>
+                  <a:txBody>
+                    <a:bodyPr/>
+                    <a:lstStyle/>
+                    <a:p>
+                      <a:r>
+                        <a:rPr lang="en-AU" sz="1800" kern="1200" dirty="0">
+                          <a:solidFill>
+                            <a:schemeClr val="dk1"/>
+                          </a:solidFill>
+                          <a:latin typeface="+mn-lt"/>
+                          <a:ea typeface="+mn-ea"/>
+                          <a:cs typeface="+mn-cs"/>
+                        </a:rPr>
+                        <a:t>Wait until the element exists</a:t>
+                      </a:r>
+                      <a:endParaRPr lang="en-US" sz="2400" dirty="0"/>
+                    </a:p>
+                  </a:txBody>
+                  <a:tcPr anchor="ctr"/>
+                </a:tc>
+                <a:extLst>
+                  <a:ext uri="{0D108BD9-81ED-4DB2-BD59-A6C34878D82A}">
+                    <a16:rowId xmlns:a16="http://schemas.microsoft.com/office/drawing/2014/main" val="828725401"/>
+                  </a:ext>
+                </a:extLst>
+              </a:tr>
+              <a:tr h="536086">
+                <a:tc>
+                  <a:txBody>
+                    <a:bodyPr/>
+                    <a:lstStyle/>
+                    <a:p>
+                      <a:r>
+                        <a:rPr lang="en-US" sz="2400" dirty="0" err="1"/>
+                        <a:t>WaitUntilElementCssDisplayed</a:t>
+                      </a:r>
+                      <a:endParaRPr lang="en-US" sz="2400" dirty="0"/>
+                    </a:p>
+                  </a:txBody>
+                  <a:tcPr anchor="ctr"/>
+                </a:tc>
+                <a:tc>
+                  <a:txBody>
+                    <a:bodyPr/>
+                    <a:lstStyle/>
+                    <a:p>
+                      <a:r>
+                        <a:rPr lang="en-AU" sz="1800" kern="1200" dirty="0">
+                          <a:solidFill>
+                            <a:schemeClr val="dk1"/>
+                          </a:solidFill>
+                          <a:latin typeface="+mn-lt"/>
+                          <a:ea typeface="+mn-ea"/>
+                          <a:cs typeface="+mn-cs"/>
+                        </a:rPr>
+                        <a:t>Wait until the element is </a:t>
+                      </a:r>
+                      <a:r>
+                        <a:rPr lang="en-AU" sz="1800" kern="1200" dirty="0" err="1">
+                          <a:solidFill>
+                            <a:schemeClr val="dk1"/>
+                          </a:solidFill>
+                          <a:latin typeface="+mn-lt"/>
+                          <a:ea typeface="+mn-ea"/>
+                          <a:cs typeface="+mn-cs"/>
+                        </a:rPr>
+                        <a:t>Css</a:t>
+                      </a:r>
+                      <a:r>
+                        <a:rPr lang="en-AU" sz="1800" kern="1200" dirty="0">
+                          <a:solidFill>
+                            <a:schemeClr val="dk1"/>
+                          </a:solidFill>
+                          <a:latin typeface="+mn-lt"/>
+                          <a:ea typeface="+mn-ea"/>
+                          <a:cs typeface="+mn-cs"/>
+                        </a:rPr>
+                        <a:t> Displayed (display: none not applied)</a:t>
+                      </a:r>
+                      <a:endParaRPr lang="en-US" sz="2400" dirty="0"/>
+                    </a:p>
+                  </a:txBody>
+                  <a:tcPr anchor="ctr"/>
+                </a:tc>
+                <a:extLst>
+                  <a:ext uri="{0D108BD9-81ED-4DB2-BD59-A6C34878D82A}">
+                    <a16:rowId xmlns:a16="http://schemas.microsoft.com/office/drawing/2014/main" val="647168216"/>
+                  </a:ext>
+                </a:extLst>
+              </a:tr>
+              <a:tr h="536086">
+                <a:tc>
+                  <a:txBody>
+                    <a:bodyPr/>
+                    <a:lstStyle/>
+                    <a:p>
+                      <a:r>
+                        <a:rPr lang="en-US" sz="2400" dirty="0" err="1"/>
+                        <a:t>WaitUntilElementClickable</a:t>
+                      </a:r>
+                      <a:endParaRPr lang="en-US" sz="2400" dirty="0"/>
+                    </a:p>
+                  </a:txBody>
+                  <a:tcPr anchor="ctr"/>
+                </a:tc>
+                <a:tc>
+                  <a:txBody>
+                    <a:bodyPr/>
+                    <a:lstStyle/>
+                    <a:p>
+                      <a:r>
+                        <a:rPr lang="en-AU" sz="1800" kern="1200" dirty="0">
+                          <a:solidFill>
+                            <a:schemeClr val="dk1"/>
+                          </a:solidFill>
+                          <a:latin typeface="+mn-lt"/>
+                          <a:ea typeface="+mn-ea"/>
+                          <a:cs typeface="+mn-cs"/>
+                        </a:rPr>
+                        <a:t>Wait until the element is clickable, which is element Exists, Displayed, </a:t>
+                      </a:r>
+                      <a:r>
+                        <a:rPr lang="en-AU" sz="1800" kern="1200" dirty="0" err="1">
+                          <a:solidFill>
+                            <a:schemeClr val="dk1"/>
+                          </a:solidFill>
+                          <a:latin typeface="+mn-lt"/>
+                          <a:ea typeface="+mn-ea"/>
+                          <a:cs typeface="+mn-cs"/>
+                        </a:rPr>
+                        <a:t>CssDisplayed</a:t>
+                      </a:r>
+                      <a:r>
+                        <a:rPr lang="en-AU" sz="1800" kern="1200" dirty="0">
+                          <a:solidFill>
+                            <a:schemeClr val="dk1"/>
+                          </a:solidFill>
+                          <a:latin typeface="+mn-lt"/>
+                          <a:ea typeface="+mn-ea"/>
+                          <a:cs typeface="+mn-cs"/>
+                        </a:rPr>
+                        <a:t> and Enabled</a:t>
+                      </a:r>
+                      <a:endParaRPr lang="en-US" sz="2400" dirty="0"/>
+                    </a:p>
+                  </a:txBody>
+                  <a:tcPr anchor="ctr"/>
+                </a:tc>
+                <a:extLst>
+                  <a:ext uri="{0D108BD9-81ED-4DB2-BD59-A6C34878D82A}">
+                    <a16:rowId xmlns:a16="http://schemas.microsoft.com/office/drawing/2014/main" val="2656764456"/>
+                  </a:ext>
+                </a:extLst>
+              </a:tr>
+              <a:tr h="536086">
+                <a:tc>
+                  <a:txBody>
+                    <a:bodyPr/>
+                    <a:lstStyle/>
+                    <a:p>
+                      <a:r>
+                        <a:rPr lang="en-US" sz="2400" dirty="0" err="1"/>
+                        <a:t>WaitUntilElementTextTrimEquals</a:t>
+                      </a:r>
+                      <a:endParaRPr lang="en-US" sz="2400" dirty="0"/>
+                    </a:p>
+                  </a:txBody>
+                  <a:tcPr anchor="ctr"/>
+                </a:tc>
+                <a:tc>
+                  <a:txBody>
+                    <a:bodyPr/>
+                    <a:lstStyle/>
+                    <a:p>
+                      <a:r>
+                        <a:rPr lang="en-AU" sz="1800" kern="1200" dirty="0">
+                          <a:solidFill>
+                            <a:schemeClr val="dk1"/>
+                          </a:solidFill>
+                          <a:latin typeface="+mn-lt"/>
+                          <a:ea typeface="+mn-ea"/>
+                          <a:cs typeface="+mn-cs"/>
+                        </a:rPr>
+                        <a:t>Wait until the text on the element after trim is equal to the text passed for match</a:t>
+                      </a:r>
+                      <a:endParaRPr lang="en-US" sz="2400" dirty="0"/>
+                    </a:p>
+                  </a:txBody>
+                  <a:tcPr anchor="ctr"/>
+                </a:tc>
+                <a:extLst>
+                  <a:ext uri="{0D108BD9-81ED-4DB2-BD59-A6C34878D82A}">
+                    <a16:rowId xmlns:a16="http://schemas.microsoft.com/office/drawing/2014/main" val="3096507076"/>
+                  </a:ext>
+                </a:extLst>
+              </a:tr>
+              <a:tr h="536086">
+                <a:tc>
+                  <a:txBody>
+                    <a:bodyPr/>
+                    <a:lstStyle/>
+                    <a:p>
+                      <a:r>
+                        <a:rPr lang="en-US" sz="2400" dirty="0" err="1"/>
+                        <a:t>WaitUntilElementTextStartsWith</a:t>
+                      </a:r>
+                      <a:endParaRPr lang="en-US" sz="2400" dirty="0"/>
+                    </a:p>
+                  </a:txBody>
+                  <a:tcPr anchor="ctr"/>
+                </a:tc>
+                <a:tc>
+                  <a:txBody>
+                    <a:bodyPr/>
+                    <a:lstStyle/>
+                    <a:p>
+                      <a:r>
+                        <a:rPr lang="en-AU" sz="1800" kern="1200" dirty="0">
+                          <a:solidFill>
+                            <a:schemeClr val="dk1"/>
+                          </a:solidFill>
+                          <a:latin typeface="+mn-lt"/>
+                          <a:ea typeface="+mn-ea"/>
+                          <a:cs typeface="+mn-cs"/>
+                        </a:rPr>
+                        <a:t>Wait until the text on the element after trim is starts with the text passed for match</a:t>
+                      </a:r>
+                      <a:endParaRPr lang="en-US" sz="2400" dirty="0"/>
+                    </a:p>
+                  </a:txBody>
+                  <a:tcPr anchor="ctr"/>
+                </a:tc>
+                <a:extLst>
+                  <a:ext uri="{0D108BD9-81ED-4DB2-BD59-A6C34878D82A}">
+                    <a16:rowId xmlns:a16="http://schemas.microsoft.com/office/drawing/2014/main" val="1249895681"/>
+                  </a:ext>
+                </a:extLst>
+              </a:tr>
+              <a:tr h="536086">
+                <a:tc>
+                  <a:txBody>
+                    <a:bodyPr/>
+                    <a:lstStyle/>
+                    <a:p>
+                      <a:r>
+                        <a:rPr lang="en-US" sz="2400" dirty="0" err="1"/>
+                        <a:t>WaitUntilElementTextContains</a:t>
+                      </a:r>
+                      <a:endParaRPr lang="en-US" sz="2400" dirty="0"/>
+                    </a:p>
+                  </a:txBody>
+                  <a:tcPr anchor="ctr"/>
+                </a:tc>
+                <a:tc>
+                  <a:txBody>
+                    <a:bodyPr/>
+                    <a:lstStyle/>
+                    <a:p>
+                      <a:r>
+                        <a:rPr lang="en-AU" sz="1800" kern="1200" dirty="0">
+                          <a:solidFill>
+                            <a:schemeClr val="dk1"/>
+                          </a:solidFill>
+                          <a:latin typeface="+mn-lt"/>
+                          <a:ea typeface="+mn-ea"/>
+                          <a:cs typeface="+mn-cs"/>
+                        </a:rPr>
+                        <a:t>Wait until the text on the element contains the text passed for match</a:t>
+                      </a:r>
+                      <a:endParaRPr lang="en-US" sz="2400" dirty="0"/>
+                    </a:p>
+                  </a:txBody>
+                  <a:tcPr anchor="ctr"/>
+                </a:tc>
+                <a:extLst>
+                  <a:ext uri="{0D108BD9-81ED-4DB2-BD59-A6C34878D82A}">
+                    <a16:rowId xmlns:a16="http://schemas.microsoft.com/office/drawing/2014/main" val="148330631"/>
+                  </a:ext>
+                </a:extLst>
+              </a:tr>
+              <a:tr h="536086">
+                <a:tc>
+                  <a:txBody>
+                    <a:bodyPr/>
+                    <a:lstStyle/>
+                    <a:p>
+                      <a:r>
+                        <a:rPr lang="en-US" sz="2400" dirty="0" err="1"/>
+                        <a:t>WaitUntilElementHasSomeText</a:t>
+                      </a:r>
+                      <a:endParaRPr lang="en-US" sz="2400" dirty="0"/>
+                    </a:p>
+                  </a:txBody>
+                  <a:tcPr anchor="ctr"/>
+                </a:tc>
+                <a:tc>
+                  <a:txBody>
+                    <a:bodyPr/>
+                    <a:lstStyle/>
+                    <a:p>
+                      <a:r>
+                        <a:rPr lang="en-AU" sz="1800" kern="1200" dirty="0">
+                          <a:solidFill>
+                            <a:schemeClr val="dk1"/>
+                          </a:solidFill>
+                          <a:latin typeface="+mn-lt"/>
+                          <a:ea typeface="+mn-ea"/>
+                          <a:cs typeface="+mn-cs"/>
+                        </a:rPr>
+                        <a:t>Wait until the element has any text on it</a:t>
+                      </a:r>
+                      <a:endParaRPr lang="en-US" sz="2400" dirty="0"/>
+                    </a:p>
+                  </a:txBody>
+                  <a:tcPr anchor="ctr"/>
+                </a:tc>
+                <a:extLst>
+                  <a:ext uri="{0D108BD9-81ED-4DB2-BD59-A6C34878D82A}">
+                    <a16:rowId xmlns:a16="http://schemas.microsoft.com/office/drawing/2014/main" val="628236551"/>
+                  </a:ext>
+                </a:extLst>
+              </a:tr>
+            </a:tbl>
+          </a:graphicData>
+        </a:graphic>
+      </p:graphicFrame>
+    </p:spTree>
+    <p:extLst>
+      <p:ext uri="{BB962C8B-B14F-4D97-AF65-F5344CB8AC3E}">
+        <p14:creationId xmlns:p14="http://schemas.microsoft.com/office/powerpoint/2010/main" val="2405034052"/>
+      </p:ext>
+    </p:extLst>
+  </p:cSld>
+  <p:clrMapOvr>
+    <a:masterClrMapping/>
+  </p:clrMapOvr>
+</p:sld>
+</file>
+
 <file path=ppt/theme/theme1.xml><?xml version="1.0" encoding="utf-8"?>
 <a:theme xmlns:a="http://schemas.openxmlformats.org/drawingml/2006/main" name="Metropolitan">
   <a:themeElements>

</xml_diff>

<commit_message>
adding wait operations in pptx (#13)
</commit_message>
<xml_diff>
--- a/docs/resources/presentations/Selenium Essentials.pptx
+++ b/docs/resources/presentations/Selenium Essentials.pptx
@@ -9,6 +9,7 @@
     <p:sldId id="257" r:id="rId3"/>
     <p:sldId id="258" r:id="rId4"/>
     <p:sldId id="259" r:id="rId5"/>
+    <p:sldId id="260" r:id="rId6"/>
   </p:sldIdLst>
   <p:sldSz cx="12192000" cy="6858000"/>
   <p:notesSz cx="6858000" cy="9144000"/>
@@ -6493,7 +6494,7 @@
           <a:p>
             <a:fld id="{4AAD347D-5ACD-4C99-B74B-A9C85AD731AF}" type="datetimeFigureOut">
               <a:rPr lang="en-US" smtClean="0"/>
-              <a:t>9/1/2019</a:t>
+              <a:t>9/8/2019</a:t>
             </a:fld>
             <a:endParaRPr lang="en-US" dirty="0"/>
           </a:p>
@@ -6683,7 +6684,7 @@
           <a:p>
             <a:fld id="{4AAD347D-5ACD-4C99-B74B-A9C85AD731AF}" type="datetimeFigureOut">
               <a:rPr lang="en-US" smtClean="0"/>
-              <a:t>9/1/2019</a:t>
+              <a:t>9/8/2019</a:t>
             </a:fld>
             <a:endParaRPr lang="en-US" dirty="0"/>
           </a:p>
@@ -6864,7 +6865,7 @@
           <a:p>
             <a:fld id="{4AAD347D-5ACD-4C99-B74B-A9C85AD731AF}" type="datetimeFigureOut">
               <a:rPr lang="en-US" smtClean="0"/>
-              <a:t>9/1/2019</a:t>
+              <a:t>9/8/2019</a:t>
             </a:fld>
             <a:endParaRPr lang="en-US" dirty="0"/>
           </a:p>
@@ -7035,7 +7036,7 @@
           <a:p>
             <a:fld id="{4AAD347D-5ACD-4C99-B74B-A9C85AD731AF}" type="datetimeFigureOut">
               <a:rPr lang="en-US" smtClean="0"/>
-              <a:t>9/1/2019</a:t>
+              <a:t>9/8/2019</a:t>
             </a:fld>
             <a:endParaRPr lang="en-US" dirty="0"/>
           </a:p>
@@ -7292,7 +7293,7 @@
           <a:p>
             <a:fld id="{9796027F-7875-4030-9381-8BD8C4F21935}" type="datetimeFigureOut">
               <a:rPr lang="en-US" smtClean="0"/>
-              <a:t>9/1/2019</a:t>
+              <a:t>9/8/2019</a:t>
             </a:fld>
             <a:endParaRPr lang="en-US" dirty="0"/>
           </a:p>
@@ -7580,7 +7581,7 @@
           <a:p>
             <a:fld id="{4AAD347D-5ACD-4C99-B74B-A9C85AD731AF}" type="datetimeFigureOut">
               <a:rPr lang="en-US" smtClean="0"/>
-              <a:t>9/1/2019</a:t>
+              <a:t>9/8/2019</a:t>
             </a:fld>
             <a:endParaRPr lang="en-US" dirty="0"/>
           </a:p>
@@ -8019,7 +8020,7 @@
           <a:p>
             <a:fld id="{4AAD347D-5ACD-4C99-B74B-A9C85AD731AF}" type="datetimeFigureOut">
               <a:rPr lang="en-US" smtClean="0"/>
-              <a:t>9/1/2019</a:t>
+              <a:t>9/8/2019</a:t>
             </a:fld>
             <a:endParaRPr lang="en-US" dirty="0"/>
           </a:p>
@@ -8138,7 +8139,7 @@
           <a:p>
             <a:fld id="{4509A250-FF31-4206-8172-F9D3106AACB1}" type="datetimeFigureOut">
               <a:rPr lang="en-US" smtClean="0"/>
-              <a:t>9/1/2019</a:t>
+              <a:t>9/8/2019</a:t>
             </a:fld>
             <a:endParaRPr lang="en-US" dirty="0"/>
           </a:p>
@@ -8233,7 +8234,7 @@
           <a:p>
             <a:fld id="{4509A250-FF31-4206-8172-F9D3106AACB1}" type="datetimeFigureOut">
               <a:rPr lang="en-US" smtClean="0"/>
-              <a:t>9/1/2019</a:t>
+              <a:t>9/8/2019</a:t>
             </a:fld>
             <a:endParaRPr lang="en-US" dirty="0"/>
           </a:p>
@@ -8589,7 +8590,7 @@
           <a:p>
             <a:fld id="{4AAD347D-5ACD-4C99-B74B-A9C85AD731AF}" type="datetimeFigureOut">
               <a:rPr lang="en-US" smtClean="0"/>
-              <a:t>9/1/2019</a:t>
+              <a:t>9/8/2019</a:t>
             </a:fld>
             <a:endParaRPr lang="en-US" dirty="0"/>
           </a:p>
@@ -8906,7 +8907,7 @@
           <a:p>
             <a:fld id="{4509A250-FF31-4206-8172-F9D3106AACB1}" type="datetimeFigureOut">
               <a:rPr lang="en-US" smtClean="0"/>
-              <a:t>9/1/2019</a:t>
+              <a:t>9/8/2019</a:t>
             </a:fld>
             <a:endParaRPr lang="en-US" dirty="0"/>
           </a:p>
@@ -9139,7 +9140,7 @@
           <a:p>
             <a:fld id="{4AAD347D-5ACD-4C99-B74B-A9C85AD731AF}" type="datetimeFigureOut">
               <a:rPr lang="en-US" smtClean="0"/>
-              <a:t>9/1/2019</a:t>
+              <a:t>9/8/2019</a:t>
             </a:fld>
             <a:endParaRPr lang="en-US" dirty="0"/>
           </a:p>
@@ -13421,6 +13422,583 @@
 </p:sld>
 </file>
 
+<file path=ppt/slides/slide5.xml><?xml version="1.0" encoding="utf-8"?>
+<p:sld xmlns:a="http://schemas.openxmlformats.org/drawingml/2006/main" xmlns:r="http://schemas.openxmlformats.org/officeDocument/2006/relationships" xmlns:p="http://schemas.openxmlformats.org/presentationml/2006/main">
+  <p:cSld>
+    <p:spTree>
+      <p:nvGrpSpPr>
+        <p:cNvPr id="1" name=""/>
+        <p:cNvGrpSpPr/>
+        <p:nvPr/>
+      </p:nvGrpSpPr>
+      <p:grpSpPr>
+        <a:xfrm>
+          <a:off x="0" y="0"/>
+          <a:ext cx="0" cy="0"/>
+          <a:chOff x="0" y="0"/>
+          <a:chExt cx="0" cy="0"/>
+        </a:xfrm>
+      </p:grpSpPr>
+      <p:graphicFrame>
+        <p:nvGraphicFramePr>
+          <p:cNvPr id="4" name="Table 4">
+            <a:extLst>
+              <a:ext uri="{FF2B5EF4-FFF2-40B4-BE49-F238E27FC236}">
+                <a16:creationId xmlns:a16="http://schemas.microsoft.com/office/drawing/2014/main" id="{74DB245F-8A67-4C19-AE14-B222653D6F88}"/>
+              </a:ext>
+            </a:extLst>
+          </p:cNvPr>
+          <p:cNvGraphicFramePr>
+            <a:graphicFrameLocks noGrp="1"/>
+          </p:cNvGraphicFramePr>
+          <p:nvPr>
+            <p:extLst>
+              <p:ext uri="{D42A27DB-BD31-4B8C-83A1-F6EECF244321}">
+                <p14:modId xmlns:p14="http://schemas.microsoft.com/office/powerpoint/2010/main" val="892003522"/>
+              </p:ext>
+            </p:extLst>
+          </p:nvPr>
+        </p:nvGraphicFramePr>
+        <p:xfrm>
+          <a:off x="163891" y="166384"/>
+          <a:ext cx="11869892" cy="6104934"/>
+        </p:xfrm>
+        <a:graphic>
+          <a:graphicData uri="http://schemas.openxmlformats.org/drawingml/2006/table">
+            <a:tbl>
+              <a:tblPr firstRow="1" bandRow="1">
+                <a:tableStyleId>{5C22544A-7EE6-4342-B048-85BDC9FD1C3A}</a:tableStyleId>
+              </a:tblPr>
+              <a:tblGrid>
+                <a:gridCol w="4219645">
+                  <a:extLst>
+                    <a:ext uri="{9D8B030D-6E8A-4147-A177-3AD203B41FA5}">
+                      <a16:colId xmlns:a16="http://schemas.microsoft.com/office/drawing/2014/main" val="2722989189"/>
+                    </a:ext>
+                  </a:extLst>
+                </a:gridCol>
+                <a:gridCol w="7650247">
+                  <a:extLst>
+                    <a:ext uri="{9D8B030D-6E8A-4147-A177-3AD203B41FA5}">
+                      <a16:colId xmlns:a16="http://schemas.microsoft.com/office/drawing/2014/main" val="1463560156"/>
+                    </a:ext>
+                  </a:extLst>
+                </a:gridCol>
+              </a:tblGrid>
+              <a:tr h="536086">
+                <a:tc>
+                  <a:txBody>
+                    <a:bodyPr/>
+                    <a:lstStyle/>
+                    <a:p>
+                      <a:r>
+                        <a:rPr lang="en-US" sz="2400" dirty="0"/>
+                        <a:t>Wait Methods</a:t>
+                      </a:r>
+                    </a:p>
+                  </a:txBody>
+                  <a:tcPr anchor="ctr"/>
+                </a:tc>
+                <a:tc>
+                  <a:txBody>
+                    <a:bodyPr/>
+                    <a:lstStyle/>
+                    <a:p>
+                      <a:r>
+                        <a:rPr lang="en-US" sz="2400" dirty="0"/>
+                        <a:t>Description</a:t>
+                      </a:r>
+                    </a:p>
+                  </a:txBody>
+                  <a:tcPr anchor="ctr"/>
+                </a:tc>
+                <a:extLst>
+                  <a:ext uri="{0D108BD9-81ED-4DB2-BD59-A6C34878D82A}">
+                    <a16:rowId xmlns:a16="http://schemas.microsoft.com/office/drawing/2014/main" val="2543134648"/>
+                  </a:ext>
+                </a:extLst>
+              </a:tr>
+              <a:tr h="536086">
+                <a:tc>
+                  <a:txBody>
+                    <a:bodyPr/>
+                    <a:lstStyle/>
+                    <a:p>
+                      <a:r>
+                        <a:rPr lang="en-US" sz="2400" dirty="0" err="1"/>
+                        <a:t>WaitUntilElementVisible</a:t>
+                      </a:r>
+                      <a:endParaRPr lang="en-US" sz="2400" dirty="0"/>
+                    </a:p>
+                  </a:txBody>
+                  <a:tcPr anchor="ctr"/>
+                </a:tc>
+                <a:tc>
+                  <a:txBody>
+                    <a:bodyPr/>
+                    <a:lstStyle/>
+                    <a:p>
+                      <a:r>
+                        <a:rPr lang="en-AU" sz="1800" kern="1200" dirty="0">
+                          <a:solidFill>
+                            <a:schemeClr val="dk1"/>
+                          </a:solidFill>
+                          <a:latin typeface="+mn-lt"/>
+                          <a:ea typeface="+mn-ea"/>
+                          <a:cs typeface="+mn-cs"/>
+                        </a:rPr>
+                        <a:t>Wait until the element is visible</a:t>
+                      </a:r>
+                      <a:endParaRPr lang="en-US" sz="2400" dirty="0"/>
+                    </a:p>
+                  </a:txBody>
+                  <a:tcPr anchor="ctr"/>
+                </a:tc>
+                <a:extLst>
+                  <a:ext uri="{0D108BD9-81ED-4DB2-BD59-A6C34878D82A}">
+                    <a16:rowId xmlns:a16="http://schemas.microsoft.com/office/drawing/2014/main" val="1771650175"/>
+                  </a:ext>
+                </a:extLst>
+              </a:tr>
+              <a:tr h="536086">
+                <a:tc>
+                  <a:txBody>
+                    <a:bodyPr/>
+                    <a:lstStyle/>
+                    <a:p>
+                      <a:r>
+                        <a:rPr lang="en-US" sz="2400" dirty="0" err="1"/>
+                        <a:t>WaitUntilElementInvisible</a:t>
+                      </a:r>
+                      <a:endParaRPr lang="en-US" sz="2400" dirty="0"/>
+                    </a:p>
+                  </a:txBody>
+                  <a:tcPr anchor="ctr"/>
+                </a:tc>
+                <a:tc>
+                  <a:txBody>
+                    <a:bodyPr/>
+                    <a:lstStyle/>
+                    <a:p>
+                      <a:r>
+                        <a:rPr lang="en-AU" sz="1800" kern="1200" dirty="0">
+                          <a:solidFill>
+                            <a:schemeClr val="dk1"/>
+                          </a:solidFill>
+                          <a:latin typeface="+mn-lt"/>
+                          <a:ea typeface="+mn-ea"/>
+                          <a:cs typeface="+mn-cs"/>
+                        </a:rPr>
+                        <a:t>Wait until the element goes invisible </a:t>
+                      </a:r>
+                      <a:endParaRPr lang="en-US" sz="2400" dirty="0"/>
+                    </a:p>
+                  </a:txBody>
+                  <a:tcPr anchor="ctr"/>
+                </a:tc>
+                <a:extLst>
+                  <a:ext uri="{0D108BD9-81ED-4DB2-BD59-A6C34878D82A}">
+                    <a16:rowId xmlns:a16="http://schemas.microsoft.com/office/drawing/2014/main" val="2179964973"/>
+                  </a:ext>
+                </a:extLst>
+              </a:tr>
+              <a:tr h="536086">
+                <a:tc>
+                  <a:txBody>
+                    <a:bodyPr/>
+                    <a:lstStyle/>
+                    <a:p>
+                      <a:r>
+                        <a:rPr lang="en-US" sz="2400" dirty="0" err="1"/>
+                        <a:t>WaitUntilElementEnabled</a:t>
+                      </a:r>
+                      <a:endParaRPr lang="en-US" sz="2400" dirty="0"/>
+                    </a:p>
+                  </a:txBody>
+                  <a:tcPr anchor="ctr"/>
+                </a:tc>
+                <a:tc>
+                  <a:txBody>
+                    <a:bodyPr/>
+                    <a:lstStyle/>
+                    <a:p>
+                      <a:r>
+                        <a:rPr lang="en-AU" sz="1800" kern="1200" dirty="0">
+                          <a:solidFill>
+                            <a:schemeClr val="dk1"/>
+                          </a:solidFill>
+                          <a:latin typeface="+mn-lt"/>
+                          <a:ea typeface="+mn-ea"/>
+                          <a:cs typeface="+mn-cs"/>
+                        </a:rPr>
+                        <a:t>Wait until the element is enabled</a:t>
+                      </a:r>
+                      <a:endParaRPr lang="en-US" sz="2400" dirty="0"/>
+                    </a:p>
+                  </a:txBody>
+                  <a:tcPr anchor="ctr"/>
+                </a:tc>
+                <a:extLst>
+                  <a:ext uri="{0D108BD9-81ED-4DB2-BD59-A6C34878D82A}">
+                    <a16:rowId xmlns:a16="http://schemas.microsoft.com/office/drawing/2014/main" val="4287723469"/>
+                  </a:ext>
+                </a:extLst>
+              </a:tr>
+              <a:tr h="536086">
+                <a:tc>
+                  <a:txBody>
+                    <a:bodyPr/>
+                    <a:lstStyle/>
+                    <a:p>
+                      <a:r>
+                        <a:rPr lang="en-US" sz="2400" dirty="0" err="1"/>
+                        <a:t>WaitUntilElementExists</a:t>
+                      </a:r>
+                      <a:endParaRPr lang="en-US" sz="2400" dirty="0"/>
+                    </a:p>
+                  </a:txBody>
+                  <a:tcPr anchor="ctr"/>
+                </a:tc>
+                <a:tc>
+                  <a:txBody>
+                    <a:bodyPr/>
+                    <a:lstStyle/>
+                    <a:p>
+                      <a:r>
+                        <a:rPr lang="en-AU" sz="1800" kern="1200" dirty="0">
+                          <a:solidFill>
+                            <a:schemeClr val="dk1"/>
+                          </a:solidFill>
+                          <a:latin typeface="+mn-lt"/>
+                          <a:ea typeface="+mn-ea"/>
+                          <a:cs typeface="+mn-cs"/>
+                        </a:rPr>
+                        <a:t>Wait until the element exists</a:t>
+                      </a:r>
+                      <a:endParaRPr lang="en-US" sz="2400" dirty="0"/>
+                    </a:p>
+                  </a:txBody>
+                  <a:tcPr anchor="ctr"/>
+                </a:tc>
+                <a:extLst>
+                  <a:ext uri="{0D108BD9-81ED-4DB2-BD59-A6C34878D82A}">
+                    <a16:rowId xmlns:a16="http://schemas.microsoft.com/office/drawing/2014/main" val="828725401"/>
+                  </a:ext>
+                </a:extLst>
+              </a:tr>
+              <a:tr h="536086">
+                <a:tc>
+                  <a:txBody>
+                    <a:bodyPr/>
+                    <a:lstStyle/>
+                    <a:p>
+                      <a:r>
+                        <a:rPr lang="en-US" sz="2400" dirty="0" err="1"/>
+                        <a:t>WaitUntilElementCssDisplayed</a:t>
+                      </a:r>
+                      <a:endParaRPr lang="en-US" sz="2400" dirty="0"/>
+                    </a:p>
+                  </a:txBody>
+                  <a:tcPr anchor="ctr"/>
+                </a:tc>
+                <a:tc>
+                  <a:txBody>
+                    <a:bodyPr/>
+                    <a:lstStyle/>
+                    <a:p>
+                      <a:r>
+                        <a:rPr lang="en-AU" sz="1800" kern="1200" dirty="0">
+                          <a:solidFill>
+                            <a:schemeClr val="dk1"/>
+                          </a:solidFill>
+                          <a:latin typeface="+mn-lt"/>
+                          <a:ea typeface="+mn-ea"/>
+                          <a:cs typeface="+mn-cs"/>
+                        </a:rPr>
+                        <a:t>Wait until the element is </a:t>
+                      </a:r>
+                      <a:r>
+                        <a:rPr lang="en-AU" sz="1800" kern="1200" dirty="0" err="1">
+                          <a:solidFill>
+                            <a:schemeClr val="dk1"/>
+                          </a:solidFill>
+                          <a:latin typeface="+mn-lt"/>
+                          <a:ea typeface="+mn-ea"/>
+                          <a:cs typeface="+mn-cs"/>
+                        </a:rPr>
+                        <a:t>Css</a:t>
+                      </a:r>
+                      <a:r>
+                        <a:rPr lang="en-AU" sz="1800" kern="1200" dirty="0">
+                          <a:solidFill>
+                            <a:schemeClr val="dk1"/>
+                          </a:solidFill>
+                          <a:latin typeface="+mn-lt"/>
+                          <a:ea typeface="+mn-ea"/>
+                          <a:cs typeface="+mn-cs"/>
+                        </a:rPr>
+                        <a:t> Displayed (display: none not applied)</a:t>
+                      </a:r>
+                      <a:endParaRPr lang="en-US" sz="2400" dirty="0"/>
+                    </a:p>
+                  </a:txBody>
+                  <a:tcPr anchor="ctr"/>
+                </a:tc>
+                <a:extLst>
+                  <a:ext uri="{0D108BD9-81ED-4DB2-BD59-A6C34878D82A}">
+                    <a16:rowId xmlns:a16="http://schemas.microsoft.com/office/drawing/2014/main" val="647168216"/>
+                  </a:ext>
+                </a:extLst>
+              </a:tr>
+              <a:tr h="536086">
+                <a:tc>
+                  <a:txBody>
+                    <a:bodyPr/>
+                    <a:lstStyle/>
+                    <a:p>
+                      <a:r>
+                        <a:rPr lang="en-US" sz="2400" dirty="0" err="1"/>
+                        <a:t>WaitUntilElementClickable</a:t>
+                      </a:r>
+                      <a:endParaRPr lang="en-US" sz="2400" dirty="0"/>
+                    </a:p>
+                  </a:txBody>
+                  <a:tcPr anchor="ctr"/>
+                </a:tc>
+                <a:tc>
+                  <a:txBody>
+                    <a:bodyPr/>
+                    <a:lstStyle/>
+                    <a:p>
+                      <a:r>
+                        <a:rPr lang="en-AU" sz="1800" kern="1200" dirty="0">
+                          <a:solidFill>
+                            <a:schemeClr val="dk1"/>
+                          </a:solidFill>
+                          <a:latin typeface="+mn-lt"/>
+                          <a:ea typeface="+mn-ea"/>
+                          <a:cs typeface="+mn-cs"/>
+                        </a:rPr>
+                        <a:t>Wait until the element is clickable, which is element Exists, Displayed, </a:t>
+                      </a:r>
+                      <a:r>
+                        <a:rPr lang="en-AU" sz="1800" kern="1200" dirty="0" err="1">
+                          <a:solidFill>
+                            <a:schemeClr val="dk1"/>
+                          </a:solidFill>
+                          <a:latin typeface="+mn-lt"/>
+                          <a:ea typeface="+mn-ea"/>
+                          <a:cs typeface="+mn-cs"/>
+                        </a:rPr>
+                        <a:t>CssDisplayed</a:t>
+                      </a:r>
+                      <a:r>
+                        <a:rPr lang="en-AU" sz="1800" kern="1200" dirty="0">
+                          <a:solidFill>
+                            <a:schemeClr val="dk1"/>
+                          </a:solidFill>
+                          <a:latin typeface="+mn-lt"/>
+                          <a:ea typeface="+mn-ea"/>
+                          <a:cs typeface="+mn-cs"/>
+                        </a:rPr>
+                        <a:t> and Enabled</a:t>
+                      </a:r>
+                      <a:endParaRPr lang="en-US" sz="2400" dirty="0"/>
+                    </a:p>
+                  </a:txBody>
+                  <a:tcPr anchor="ctr"/>
+                </a:tc>
+                <a:extLst>
+                  <a:ext uri="{0D108BD9-81ED-4DB2-BD59-A6C34878D82A}">
+                    <a16:rowId xmlns:a16="http://schemas.microsoft.com/office/drawing/2014/main" val="2656764456"/>
+                  </a:ext>
+                </a:extLst>
+              </a:tr>
+              <a:tr h="536086">
+                <a:tc>
+                  <a:txBody>
+                    <a:bodyPr/>
+                    <a:lstStyle/>
+                    <a:p>
+                      <a:r>
+                        <a:rPr lang="en-US" sz="2400" dirty="0" err="1"/>
+                        <a:t>WaitUntilElementTextTrimEquals</a:t>
+                      </a:r>
+                      <a:endParaRPr lang="en-US" sz="2400" dirty="0"/>
+                    </a:p>
+                  </a:txBody>
+                  <a:tcPr anchor="ctr"/>
+                </a:tc>
+                <a:tc>
+                  <a:txBody>
+                    <a:bodyPr/>
+                    <a:lstStyle/>
+                    <a:p>
+                      <a:r>
+                        <a:rPr lang="en-AU" sz="1800" kern="1200" dirty="0">
+                          <a:solidFill>
+                            <a:schemeClr val="dk1"/>
+                          </a:solidFill>
+                          <a:latin typeface="+mn-lt"/>
+                          <a:ea typeface="+mn-ea"/>
+                          <a:cs typeface="+mn-cs"/>
+                        </a:rPr>
+                        <a:t>Wait until the text on the element after trim is equal to the text passed for match</a:t>
+                      </a:r>
+                      <a:endParaRPr lang="en-US" sz="2400" dirty="0"/>
+                    </a:p>
+                  </a:txBody>
+                  <a:tcPr anchor="ctr"/>
+                </a:tc>
+                <a:extLst>
+                  <a:ext uri="{0D108BD9-81ED-4DB2-BD59-A6C34878D82A}">
+                    <a16:rowId xmlns:a16="http://schemas.microsoft.com/office/drawing/2014/main" val="3096507076"/>
+                  </a:ext>
+                </a:extLst>
+              </a:tr>
+              <a:tr h="536086">
+                <a:tc>
+                  <a:txBody>
+                    <a:bodyPr/>
+                    <a:lstStyle/>
+                    <a:p>
+                      <a:r>
+                        <a:rPr lang="en-US" sz="2400" dirty="0" err="1"/>
+                        <a:t>WaitUntilElementTextStartsWith</a:t>
+                      </a:r>
+                      <a:endParaRPr lang="en-US" sz="2400" dirty="0"/>
+                    </a:p>
+                  </a:txBody>
+                  <a:tcPr anchor="ctr"/>
+                </a:tc>
+                <a:tc>
+                  <a:txBody>
+                    <a:bodyPr/>
+                    <a:lstStyle/>
+                    <a:p>
+                      <a:r>
+                        <a:rPr lang="en-AU" sz="1800" kern="1200" dirty="0">
+                          <a:solidFill>
+                            <a:schemeClr val="dk1"/>
+                          </a:solidFill>
+                          <a:latin typeface="+mn-lt"/>
+                          <a:ea typeface="+mn-ea"/>
+                          <a:cs typeface="+mn-cs"/>
+                        </a:rPr>
+                        <a:t>Wait until the text on the element after trim is starts with the text passed for match</a:t>
+                      </a:r>
+                      <a:endParaRPr lang="en-US" sz="2400" dirty="0"/>
+                    </a:p>
+                  </a:txBody>
+                  <a:tcPr anchor="ctr"/>
+                </a:tc>
+                <a:extLst>
+                  <a:ext uri="{0D108BD9-81ED-4DB2-BD59-A6C34878D82A}">
+                    <a16:rowId xmlns:a16="http://schemas.microsoft.com/office/drawing/2014/main" val="1249895681"/>
+                  </a:ext>
+                </a:extLst>
+              </a:tr>
+              <a:tr h="536086">
+                <a:tc>
+                  <a:txBody>
+                    <a:bodyPr/>
+                    <a:lstStyle/>
+                    <a:p>
+                      <a:r>
+                        <a:rPr lang="en-US" sz="2400" dirty="0" err="1"/>
+                        <a:t>WaitUntilElementTextContains</a:t>
+                      </a:r>
+                      <a:endParaRPr lang="en-US" sz="2400" dirty="0"/>
+                    </a:p>
+                  </a:txBody>
+                  <a:tcPr anchor="ctr"/>
+                </a:tc>
+                <a:tc>
+                  <a:txBody>
+                    <a:bodyPr/>
+                    <a:lstStyle/>
+                    <a:p>
+                      <a:r>
+                        <a:rPr lang="en-AU" sz="1800" kern="1200" dirty="0">
+                          <a:solidFill>
+                            <a:schemeClr val="dk1"/>
+                          </a:solidFill>
+                          <a:latin typeface="+mn-lt"/>
+                          <a:ea typeface="+mn-ea"/>
+                          <a:cs typeface="+mn-cs"/>
+                        </a:rPr>
+                        <a:t>Wait until the text on the element contains the text passed for match</a:t>
+                      </a:r>
+                      <a:endParaRPr lang="en-US" sz="2400" dirty="0"/>
+                    </a:p>
+                  </a:txBody>
+                  <a:tcPr anchor="ctr"/>
+                </a:tc>
+                <a:extLst>
+                  <a:ext uri="{0D108BD9-81ED-4DB2-BD59-A6C34878D82A}">
+                    <a16:rowId xmlns:a16="http://schemas.microsoft.com/office/drawing/2014/main" val="148330631"/>
+                  </a:ext>
+                </a:extLst>
+              </a:tr>
+              <a:tr h="536086">
+                <a:tc>
+                  <a:txBody>
+                    <a:bodyPr/>
+                    <a:lstStyle/>
+                    <a:p>
+                      <a:r>
+                        <a:rPr lang="en-US" sz="2400" dirty="0" err="1"/>
+                        <a:t>WaitUntilElementHasSomeText</a:t>
+                      </a:r>
+                      <a:endParaRPr lang="en-US" sz="2400" dirty="0"/>
+                    </a:p>
+                  </a:txBody>
+                  <a:tcPr anchor="ctr"/>
+                </a:tc>
+                <a:tc>
+                  <a:txBody>
+                    <a:bodyPr/>
+                    <a:lstStyle/>
+                    <a:p>
+                      <a:r>
+                        <a:rPr lang="en-AU" sz="1800" kern="1200" dirty="0">
+                          <a:solidFill>
+                            <a:schemeClr val="dk1"/>
+                          </a:solidFill>
+                          <a:latin typeface="+mn-lt"/>
+                          <a:ea typeface="+mn-ea"/>
+                          <a:cs typeface="+mn-cs"/>
+                        </a:rPr>
+                        <a:t>Wait until the element has any text on it</a:t>
+                      </a:r>
+                      <a:endParaRPr lang="en-US" sz="2400" dirty="0"/>
+                    </a:p>
+                  </a:txBody>
+                  <a:tcPr anchor="ctr"/>
+                </a:tc>
+                <a:extLst>
+                  <a:ext uri="{0D108BD9-81ED-4DB2-BD59-A6C34878D82A}">
+                    <a16:rowId xmlns:a16="http://schemas.microsoft.com/office/drawing/2014/main" val="628236551"/>
+                  </a:ext>
+                </a:extLst>
+              </a:tr>
+            </a:tbl>
+          </a:graphicData>
+        </a:graphic>
+      </p:graphicFrame>
+    </p:spTree>
+    <p:extLst>
+      <p:ext uri="{BB962C8B-B14F-4D97-AF65-F5344CB8AC3E}">
+        <p14:creationId xmlns:p14="http://schemas.microsoft.com/office/powerpoint/2010/main" val="2405034052"/>
+      </p:ext>
+    </p:extLst>
+  </p:cSld>
+  <p:clrMapOvr>
+    <a:masterClrMapping/>
+  </p:clrMapOvr>
+</p:sld>
+</file>
+
 <file path=ppt/theme/theme1.xml><?xml version="1.0" encoding="utf-8"?>
 <a:theme xmlns:a="http://schemas.openxmlformats.org/drawingml/2006/main" name="Metropolitan">
   <a:themeElements>

</xml_diff>